<commit_message>
Atualizando diagrama de solução
</commit_message>
<xml_diff>
--- a/Documentacao/Sprint 3/Diagramas/Diagrama de solução - Suporte-Cliente.pptx
+++ b/Documentacao/Sprint 3/Diagramas/Diagrama de solução - Suporte-Cliente.pptx
@@ -32,10 +32,11 @@
     <p:embeddedFont>
       <p:font typeface="Open Sans" panose="020B0606030504020204" pitchFamily="34" charset="0"/>
       <p:regular r:id="rId10"/>
+      <p:bold r:id="rId11"/>
     </p:embeddedFont>
     <p:embeddedFont>
       <p:font typeface="Open Sans Bold" panose="020B0806030504020204" charset="0"/>
-      <p:regular r:id="rId11"/>
+      <p:regular r:id="rId12"/>
     </p:embeddedFont>
   </p:embeddedFontLst>
   <p:defaultTextStyle>
@@ -3228,8 +3229,8 @@
         </p:nvGrpSpPr>
         <p:grpSpPr>
           <a:xfrm>
-            <a:off x="8286206" y="99039"/>
-            <a:ext cx="10874952" cy="10012631"/>
+            <a:off x="8096250" y="57150"/>
+            <a:ext cx="10874952" cy="9784031"/>
             <a:chOff x="-4776" y="-38100"/>
             <a:chExt cx="2520196" cy="2364398"/>
           </a:xfrm>
@@ -3537,7 +3538,7 @@
         </p:nvSpPr>
         <p:spPr>
           <a:xfrm>
-            <a:off x="1932643" y="1387488"/>
+            <a:off x="2645648" y="1387488"/>
             <a:ext cx="802402" cy="547093"/>
           </a:xfrm>
           <a:custGeom>
@@ -3589,7 +3590,7 @@
         </p:nvSpPr>
         <p:spPr>
           <a:xfrm rot="-1500387">
-            <a:off x="1603192" y="1903068"/>
+            <a:off x="2301559" y="1903068"/>
             <a:ext cx="1453812" cy="1392025"/>
           </a:xfrm>
           <a:custGeom>
@@ -3621,110 +3622,6 @@
           </a:custGeom>
           <a:blipFill>
             <a:blip r:embed="rId6"/>
-            <a:stretch>
-              <a:fillRect/>
-            </a:stretch>
-          </a:blipFill>
-        </p:spPr>
-      </p:sp>
-      <p:sp>
-        <p:nvSpPr>
-          <p:cNvPr id="14" name="Freeform 14"/>
-          <p:cNvSpPr/>
-          <p:nvPr/>
-        </p:nvSpPr>
-        <p:spPr>
-          <a:xfrm>
-            <a:off x="4938867" y="1108924"/>
-            <a:ext cx="1019791" cy="637369"/>
-          </a:xfrm>
-          <a:custGeom>
-            <a:avLst/>
-            <a:gdLst/>
-            <a:ahLst/>
-            <a:cxnLst/>
-            <a:rect l="l" t="t" r="r" b="b"/>
-            <a:pathLst>
-              <a:path w="1019791" h="637369">
-                <a:moveTo>
-                  <a:pt x="0" y="0"/>
-                </a:moveTo>
-                <a:lnTo>
-                  <a:pt x="1019791" y="0"/>
-                </a:lnTo>
-                <a:lnTo>
-                  <a:pt x="1019791" y="637369"/>
-                </a:lnTo>
-                <a:lnTo>
-                  <a:pt x="0" y="637369"/>
-                </a:lnTo>
-                <a:lnTo>
-                  <a:pt x="0" y="0"/>
-                </a:lnTo>
-                <a:close/>
-              </a:path>
-            </a:pathLst>
-          </a:custGeom>
-          <a:blipFill>
-            <a:blip r:embed="rId7">
-              <a:extLst>
-                <a:ext uri="{96DAC541-7B7A-43D3-8B79-37D633B846F1}">
-                  <asvg:svgBlip xmlns:asvg="http://schemas.microsoft.com/office/drawing/2016/SVG/main" r:embed="rId8"/>
-                </a:ext>
-              </a:extLst>
-            </a:blip>
-            <a:stretch>
-              <a:fillRect/>
-            </a:stretch>
-          </a:blipFill>
-        </p:spPr>
-      </p:sp>
-      <p:sp>
-        <p:nvSpPr>
-          <p:cNvPr id="15" name="Freeform 15"/>
-          <p:cNvSpPr/>
-          <p:nvPr/>
-        </p:nvSpPr>
-        <p:spPr>
-          <a:xfrm rot="5400000">
-            <a:off x="5210692" y="1525875"/>
-            <a:ext cx="476141" cy="817409"/>
-          </a:xfrm>
-          <a:custGeom>
-            <a:avLst/>
-            <a:gdLst/>
-            <a:ahLst/>
-            <a:cxnLst/>
-            <a:rect l="l" t="t" r="r" b="b"/>
-            <a:pathLst>
-              <a:path w="476141" h="817409">
-                <a:moveTo>
-                  <a:pt x="0" y="0"/>
-                </a:moveTo>
-                <a:lnTo>
-                  <a:pt x="476141" y="0"/>
-                </a:lnTo>
-                <a:lnTo>
-                  <a:pt x="476141" y="817410"/>
-                </a:lnTo>
-                <a:lnTo>
-                  <a:pt x="0" y="817410"/>
-                </a:lnTo>
-                <a:lnTo>
-                  <a:pt x="0" y="0"/>
-                </a:lnTo>
-                <a:close/>
-              </a:path>
-            </a:pathLst>
-          </a:custGeom>
-          <a:blipFill>
-            <a:blip r:embed="rId9">
-              <a:extLst>
-                <a:ext uri="{96DAC541-7B7A-43D3-8B79-37D633B846F1}">
-                  <asvg:svgBlip xmlns:asvg="http://schemas.microsoft.com/office/drawing/2016/SVG/main" r:embed="rId10"/>
-                </a:ext>
-              </a:extLst>
-            </a:blip>
             <a:stretch>
               <a:fillRect/>
             </a:stretch>
@@ -3784,7 +3681,7 @@
               </a:pathLst>
             </a:custGeom>
             <a:blipFill>
-              <a:blip r:embed="rId11"/>
+              <a:blip r:embed="rId7"/>
               <a:stretch>
                 <a:fillRect/>
               </a:stretch>
@@ -3830,10 +3727,10 @@
               </a:pathLst>
             </a:custGeom>
             <a:blipFill>
-              <a:blip r:embed="rId12">
+              <a:blip r:embed="rId8">
                 <a:extLst>
                   <a:ext uri="{96DAC541-7B7A-43D3-8B79-37D633B846F1}">
-                    <asvg:svgBlip xmlns:asvg="http://schemas.microsoft.com/office/drawing/2016/SVG/main" r:embed="rId13"/>
+                    <asvg:svgBlip xmlns:asvg="http://schemas.microsoft.com/office/drawing/2016/SVG/main" r:embed="rId9"/>
                   </a:ext>
                 </a:extLst>
               </a:blip>
@@ -4100,10 +3997,10 @@
             </a:pathLst>
           </a:custGeom>
           <a:blipFill>
-            <a:blip r:embed="rId14">
+            <a:blip r:embed="rId10">
               <a:extLst>
                 <a:ext uri="{96DAC541-7B7A-43D3-8B79-37D633B846F1}">
-                  <asvg:svgBlip xmlns:asvg="http://schemas.microsoft.com/office/drawing/2016/SVG/main" r:embed="rId15"/>
+                  <asvg:svgBlip xmlns:asvg="http://schemas.microsoft.com/office/drawing/2016/SVG/main" r:embed="rId11"/>
                 </a:ext>
               </a:extLst>
             </a:blip>
@@ -4517,10 +4414,10 @@
             </a:pathLst>
           </a:custGeom>
           <a:blipFill>
-            <a:blip r:embed="rId16">
+            <a:blip r:embed="rId12">
               <a:extLst>
                 <a:ext uri="{96DAC541-7B7A-43D3-8B79-37D633B846F1}">
-                  <asvg:svgBlip xmlns:asvg="http://schemas.microsoft.com/office/drawing/2016/SVG/main" r:embed="rId17"/>
+                  <asvg:svgBlip xmlns:asvg="http://schemas.microsoft.com/office/drawing/2016/SVG/main" r:embed="rId13"/>
                 </a:ext>
               </a:extLst>
             </a:blip>
@@ -4569,7 +4466,7 @@
             </a:pathLst>
           </a:custGeom>
           <a:blipFill>
-            <a:blip r:embed="rId18"/>
+            <a:blip r:embed="rId14"/>
             <a:stretch>
               <a:fillRect/>
             </a:stretch>
@@ -4584,7 +4481,7 @@
         </p:nvSpPr>
         <p:spPr>
           <a:xfrm>
-            <a:off x="9955928" y="1766349"/>
+            <a:off x="10089653" y="1708249"/>
             <a:ext cx="444997" cy="406301"/>
           </a:xfrm>
           <a:custGeom>
@@ -4615,7 +4512,7 @@
             </a:pathLst>
           </a:custGeom>
           <a:blipFill>
-            <a:blip r:embed="rId19"/>
+            <a:blip r:embed="rId15"/>
             <a:stretch>
               <a:fillRect/>
             </a:stretch>
@@ -4744,174 +4641,13 @@
             </a:pathLst>
           </a:custGeom>
           <a:blipFill>
-            <a:blip r:embed="rId20">
+            <a:blip r:embed="rId16">
               <a:extLst>
                 <a:ext uri="{96DAC541-7B7A-43D3-8B79-37D633B846F1}">
-                  <asvg:svgBlip xmlns:asvg="http://schemas.microsoft.com/office/drawing/2016/SVG/main" r:embed="rId21"/>
+                  <asvg:svgBlip xmlns:asvg="http://schemas.microsoft.com/office/drawing/2016/SVG/main" r:embed="rId17"/>
                 </a:ext>
               </a:extLst>
             </a:blip>
-            <a:stretch>
-              <a:fillRect/>
-            </a:stretch>
-          </a:blipFill>
-        </p:spPr>
-      </p:sp>
-      <p:grpSp>
-        <p:nvGrpSpPr>
-          <p:cNvPr id="41" name="Group 41"/>
-          <p:cNvGrpSpPr/>
-          <p:nvPr/>
-        </p:nvGrpSpPr>
-        <p:grpSpPr>
-          <a:xfrm>
-            <a:off x="9153472" y="3416982"/>
-            <a:ext cx="1907215" cy="1831841"/>
-            <a:chOff x="0" y="0"/>
-            <a:chExt cx="672031" cy="655417"/>
-          </a:xfrm>
-        </p:grpSpPr>
-        <p:sp>
-          <p:nvSpPr>
-            <p:cNvPr id="42" name="Freeform 42"/>
-            <p:cNvSpPr/>
-            <p:nvPr/>
-          </p:nvSpPr>
-          <p:spPr>
-            <a:xfrm>
-              <a:off x="0" y="0"/>
-              <a:ext cx="672031" cy="655417"/>
-            </a:xfrm>
-            <a:custGeom>
-              <a:avLst/>
-              <a:gdLst/>
-              <a:ahLst/>
-              <a:cxnLst/>
-              <a:rect l="l" t="t" r="r" b="b"/>
-              <a:pathLst>
-                <a:path w="672031" h="655417">
-                  <a:moveTo>
-                    <a:pt x="81186" y="0"/>
-                  </a:moveTo>
-                  <a:lnTo>
-                    <a:pt x="590845" y="0"/>
-                  </a:lnTo>
-                  <a:cubicBezTo>
-                    <a:pt x="635683" y="0"/>
-                    <a:pt x="672031" y="36348"/>
-                    <a:pt x="672031" y="81186"/>
-                  </a:cubicBezTo>
-                  <a:lnTo>
-                    <a:pt x="672031" y="574231"/>
-                  </a:lnTo>
-                  <a:cubicBezTo>
-                    <a:pt x="672031" y="619069"/>
-                    <a:pt x="635683" y="655417"/>
-                    <a:pt x="590845" y="655417"/>
-                  </a:cubicBezTo>
-                  <a:lnTo>
-                    <a:pt x="81186" y="655417"/>
-                  </a:lnTo>
-                  <a:cubicBezTo>
-                    <a:pt x="36348" y="655417"/>
-                    <a:pt x="0" y="619069"/>
-                    <a:pt x="0" y="574231"/>
-                  </a:cubicBezTo>
-                  <a:lnTo>
-                    <a:pt x="0" y="81186"/>
-                  </a:lnTo>
-                  <a:cubicBezTo>
-                    <a:pt x="0" y="36348"/>
-                    <a:pt x="36348" y="0"/>
-                    <a:pt x="81186" y="0"/>
-                  </a:cubicBezTo>
-                  <a:close/>
-                </a:path>
-              </a:pathLst>
-            </a:custGeom>
-            <a:solidFill>
-              <a:srgbClr val="000000">
-                <a:alpha val="0"/>
-              </a:srgbClr>
-            </a:solidFill>
-            <a:ln w="38100" cap="sq">
-              <a:solidFill>
-                <a:srgbClr val="000000"/>
-              </a:solidFill>
-              <a:prstDash val="solid"/>
-              <a:miter/>
-            </a:ln>
-          </p:spPr>
-        </p:sp>
-        <p:sp>
-          <p:nvSpPr>
-            <p:cNvPr id="43" name="TextBox 43"/>
-            <p:cNvSpPr txBox="1"/>
-            <p:nvPr/>
-          </p:nvSpPr>
-          <p:spPr>
-            <a:xfrm>
-              <a:off x="0" y="-38100"/>
-              <a:ext cx="672031" cy="693517"/>
-            </a:xfrm>
-            <a:prstGeom prst="rect">
-              <a:avLst/>
-            </a:prstGeom>
-          </p:spPr>
-          <p:txBody>
-            <a:bodyPr lIns="51196" tIns="51196" rIns="51196" bIns="51196" rtlCol="0" anchor="ctr"/>
-            <a:lstStyle/>
-            <a:p>
-              <a:pPr algn="ctr">
-                <a:lnSpc>
-                  <a:spcPts val="2966"/>
-                </a:lnSpc>
-              </a:pPr>
-              <a:endParaRPr/>
-            </a:p>
-          </p:txBody>
-        </p:sp>
-      </p:grpSp>
-      <p:sp>
-        <p:nvSpPr>
-          <p:cNvPr id="44" name="Freeform 44"/>
-          <p:cNvSpPr/>
-          <p:nvPr/>
-        </p:nvSpPr>
-        <p:spPr>
-          <a:xfrm>
-            <a:off x="9606635" y="4208365"/>
-            <a:ext cx="942728" cy="942728"/>
-          </a:xfrm>
-          <a:custGeom>
-            <a:avLst/>
-            <a:gdLst/>
-            <a:ahLst/>
-            <a:cxnLst/>
-            <a:rect l="l" t="t" r="r" b="b"/>
-            <a:pathLst>
-              <a:path w="942728" h="942728">
-                <a:moveTo>
-                  <a:pt x="0" y="0"/>
-                </a:moveTo>
-                <a:lnTo>
-                  <a:pt x="942729" y="0"/>
-                </a:lnTo>
-                <a:lnTo>
-                  <a:pt x="942729" y="942728"/>
-                </a:lnTo>
-                <a:lnTo>
-                  <a:pt x="0" y="942728"/>
-                </a:lnTo>
-                <a:lnTo>
-                  <a:pt x="0" y="0"/>
-                </a:lnTo>
-                <a:close/>
-              </a:path>
-            </a:pathLst>
-          </a:custGeom>
-          <a:blipFill>
-            <a:blip r:embed="rId22"/>
             <a:stretch>
               <a:fillRect/>
             </a:stretch>
@@ -4971,10 +4707,10 @@
               </a:pathLst>
             </a:custGeom>
             <a:blipFill>
-              <a:blip r:embed="rId23">
+              <a:blip r:embed="rId18">
                 <a:extLst>
                   <a:ext uri="{96DAC541-7B7A-43D3-8B79-37D633B846F1}">
-                    <asvg:svgBlip xmlns:asvg="http://schemas.microsoft.com/office/drawing/2016/SVG/main" r:embed="rId24"/>
+                    <asvg:svgBlip xmlns:asvg="http://schemas.microsoft.com/office/drawing/2016/SVG/main" r:embed="rId19"/>
                   </a:ext>
                 </a:extLst>
               </a:blip>
@@ -5142,10 +4878,10 @@
             </a:pathLst>
           </a:custGeom>
           <a:blipFill>
-            <a:blip r:embed="rId23">
+            <a:blip r:embed="rId18">
               <a:extLst>
                 <a:ext uri="{96DAC541-7B7A-43D3-8B79-37D633B846F1}">
-                  <asvg:svgBlip xmlns:asvg="http://schemas.microsoft.com/office/drawing/2016/SVG/main" r:embed="rId24"/>
+                  <asvg:svgBlip xmlns:asvg="http://schemas.microsoft.com/office/drawing/2016/SVG/main" r:embed="rId19"/>
                 </a:ext>
               </a:extLst>
             </a:blip>
@@ -5429,7 +5165,7 @@
             </a:pathLst>
           </a:custGeom>
           <a:blipFill>
-            <a:blip r:embed="rId25"/>
+            <a:blip r:embed="rId20"/>
             <a:stretch>
               <a:fillRect/>
             </a:stretch>
@@ -5475,10 +5211,10 @@
             </a:pathLst>
           </a:custGeom>
           <a:blipFill>
-            <a:blip r:embed="rId26">
+            <a:blip r:embed="rId21">
               <a:extLst>
                 <a:ext uri="{96DAC541-7B7A-43D3-8B79-37D633B846F1}">
-                  <asvg:svgBlip xmlns:asvg="http://schemas.microsoft.com/office/drawing/2016/SVG/main" r:embed="rId27"/>
+                  <asvg:svgBlip xmlns:asvg="http://schemas.microsoft.com/office/drawing/2016/SVG/main" r:embed="rId22"/>
                 </a:ext>
               </a:extLst>
             </a:blip>
@@ -5582,10 +5318,10 @@
               </a:pathLst>
             </a:custGeom>
             <a:blipFill>
-              <a:blip r:embed="rId28">
+              <a:blip r:embed="rId23">
                 <a:extLst>
                   <a:ext uri="{96DAC541-7B7A-43D3-8B79-37D633B846F1}">
-                    <asvg:svgBlip xmlns:asvg="http://schemas.microsoft.com/office/drawing/2016/SVG/main" r:embed="rId29"/>
+                    <asvg:svgBlip xmlns:asvg="http://schemas.microsoft.com/office/drawing/2016/SVG/main" r:embed="rId24"/>
                   </a:ext>
                 </a:extLst>
               </a:blip>
@@ -5649,10 +5385,10 @@
               </a:pathLst>
             </a:custGeom>
             <a:blipFill>
-              <a:blip r:embed="rId30">
+              <a:blip r:embed="rId25">
                 <a:extLst>
                   <a:ext uri="{96DAC541-7B7A-43D3-8B79-37D633B846F1}">
-                    <asvg:svgBlip xmlns:asvg="http://schemas.microsoft.com/office/drawing/2016/SVG/main" r:embed="rId31"/>
+                    <asvg:svgBlip xmlns:asvg="http://schemas.microsoft.com/office/drawing/2016/SVG/main" r:embed="rId26"/>
                   </a:ext>
                 </a:extLst>
               </a:blip>
@@ -5704,65 +5440,6 @@
           </p:txBody>
         </p:sp>
       </p:grpSp>
-      <p:sp>
-        <p:nvSpPr>
-          <p:cNvPr id="63" name="Freeform 63"/>
-          <p:cNvSpPr/>
-          <p:nvPr/>
-        </p:nvSpPr>
-        <p:spPr>
-          <a:xfrm>
-            <a:off x="9688629" y="7477228"/>
-            <a:ext cx="1116759" cy="580922"/>
-          </a:xfrm>
-          <a:custGeom>
-            <a:avLst/>
-            <a:gdLst/>
-            <a:ahLst/>
-            <a:cxnLst/>
-            <a:rect l="l" t="t" r="r" b="b"/>
-            <a:pathLst>
-              <a:path w="2189333" h="613013">
-                <a:moveTo>
-                  <a:pt x="0" y="0"/>
-                </a:moveTo>
-                <a:lnTo>
-                  <a:pt x="2189334" y="0"/>
-                </a:lnTo>
-                <a:lnTo>
-                  <a:pt x="2189334" y="613013"/>
-                </a:lnTo>
-                <a:lnTo>
-                  <a:pt x="0" y="613013"/>
-                </a:lnTo>
-                <a:lnTo>
-                  <a:pt x="0" y="0"/>
-                </a:lnTo>
-                <a:close/>
-              </a:path>
-            </a:pathLst>
-          </a:custGeom>
-          <a:blipFill>
-            <a:blip r:embed="rId16">
-              <a:extLst>
-                <a:ext uri="{96DAC541-7B7A-43D3-8B79-37D633B846F1}">
-                  <asvg:svgBlip xmlns:asvg="http://schemas.microsoft.com/office/drawing/2016/SVG/main" r:embed="rId17"/>
-                </a:ext>
-              </a:extLst>
-            </a:blip>
-            <a:stretch>
-              <a:fillRect/>
-            </a:stretch>
-          </a:blipFill>
-        </p:spPr>
-        <p:txBody>
-          <a:bodyPr/>
-          <a:lstStyle/>
-          <a:p>
-            <a:endParaRPr lang="pt-BR" dirty="0"/>
-          </a:p>
-        </p:txBody>
-      </p:sp>
       <p:grpSp>
         <p:nvGrpSpPr>
           <p:cNvPr id="64" name="Group 64"/>
@@ -5937,7 +5614,7 @@
             </a:pathLst>
           </a:custGeom>
           <a:blipFill>
-            <a:blip r:embed="rId32"/>
+            <a:blip r:embed="rId27"/>
             <a:stretch>
               <a:fillRect/>
             </a:stretch>
@@ -5990,10 +5667,10 @@
             </a:pathLst>
           </a:custGeom>
           <a:blipFill>
-            <a:blip r:embed="rId33">
+            <a:blip r:embed="rId28">
               <a:extLst>
                 <a:ext uri="{96DAC541-7B7A-43D3-8B79-37D633B846F1}">
-                  <asvg:svgBlip xmlns:asvg="http://schemas.microsoft.com/office/drawing/2016/SVG/main" r:embed="rId34"/>
+                  <asvg:svgBlip xmlns:asvg="http://schemas.microsoft.com/office/drawing/2016/SVG/main" r:embed="rId29"/>
                 </a:ext>
               </a:extLst>
             </a:blip>
@@ -6056,7 +5733,7 @@
               </a:pathLst>
             </a:custGeom>
             <a:blipFill>
-              <a:blip r:embed="rId11"/>
+              <a:blip r:embed="rId7"/>
               <a:stretch>
                 <a:fillRect/>
               </a:stretch>
@@ -6102,10 +5779,10 @@
               </a:pathLst>
             </a:custGeom>
             <a:blipFill>
-              <a:blip r:embed="rId12">
+              <a:blip r:embed="rId8">
                 <a:extLst>
                   <a:ext uri="{96DAC541-7B7A-43D3-8B79-37D633B846F1}">
-                    <asvg:svgBlip xmlns:asvg="http://schemas.microsoft.com/office/drawing/2016/SVG/main" r:embed="rId13"/>
+                    <asvg:svgBlip xmlns:asvg="http://schemas.microsoft.com/office/drawing/2016/SVG/main" r:embed="rId9"/>
                   </a:ext>
                 </a:extLst>
               </a:blip>
@@ -6206,8 +5883,8 @@
         </p:nvSpPr>
         <p:spPr>
           <a:xfrm>
-            <a:off x="7351128" y="6786092"/>
-            <a:ext cx="741130" cy="311275"/>
+            <a:off x="7334250" y="6922463"/>
+            <a:ext cx="621959" cy="297487"/>
           </a:xfrm>
           <a:custGeom>
             <a:avLst/>
@@ -6237,10 +5914,10 @@
             </a:pathLst>
           </a:custGeom>
           <a:blipFill>
-            <a:blip r:embed="rId33">
+            <a:blip r:embed="rId28">
               <a:extLst>
                 <a:ext uri="{96DAC541-7B7A-43D3-8B79-37D633B846F1}">
-                  <asvg:svgBlip xmlns:asvg="http://schemas.microsoft.com/office/drawing/2016/SVG/main" r:embed="rId34"/>
+                  <asvg:svgBlip xmlns:asvg="http://schemas.microsoft.com/office/drawing/2016/SVG/main" r:embed="rId29"/>
                 </a:ext>
               </a:extLst>
             </a:blip>
@@ -6258,7 +5935,7 @@
         </p:nvSpPr>
         <p:spPr>
           <a:xfrm rot="-10800000">
-            <a:off x="11125770" y="4351947"/>
+            <a:off x="11068050" y="7110501"/>
             <a:ext cx="375982" cy="113273"/>
           </a:xfrm>
           <a:custGeom>
@@ -6289,10 +5966,10 @@
             </a:pathLst>
           </a:custGeom>
           <a:blipFill>
-            <a:blip r:embed="rId33">
+            <a:blip r:embed="rId28">
               <a:extLst>
                 <a:ext uri="{96DAC541-7B7A-43D3-8B79-37D633B846F1}">
-                  <asvg:svgBlip xmlns:asvg="http://schemas.microsoft.com/office/drawing/2016/SVG/main" r:embed="rId34"/>
+                  <asvg:svgBlip xmlns:asvg="http://schemas.microsoft.com/office/drawing/2016/SVG/main" r:embed="rId29"/>
                 </a:ext>
               </a:extLst>
             </a:blip>
@@ -6341,10 +6018,10 @@
             </a:pathLst>
           </a:custGeom>
           <a:blipFill>
-            <a:blip r:embed="rId33">
+            <a:blip r:embed="rId28">
               <a:extLst>
                 <a:ext uri="{96DAC541-7B7A-43D3-8B79-37D633B846F1}">
-                  <asvg:svgBlip xmlns:asvg="http://schemas.microsoft.com/office/drawing/2016/SVG/main" r:embed="rId34"/>
+                  <asvg:svgBlip xmlns:asvg="http://schemas.microsoft.com/office/drawing/2016/SVG/main" r:embed="rId29"/>
                 </a:ext>
               </a:extLst>
             </a:blip>
@@ -6393,10 +6070,10 @@
             </a:pathLst>
           </a:custGeom>
           <a:blipFill>
-            <a:blip r:embed="rId35">
+            <a:blip r:embed="rId30">
               <a:extLst>
                 <a:ext uri="{96DAC541-7B7A-43D3-8B79-37D633B846F1}">
-                  <asvg:svgBlip xmlns:asvg="http://schemas.microsoft.com/office/drawing/2016/SVG/main" r:embed="rId36"/>
+                  <asvg:svgBlip xmlns:asvg="http://schemas.microsoft.com/office/drawing/2016/SVG/main" r:embed="rId31"/>
                 </a:ext>
               </a:extLst>
             </a:blip>
@@ -6445,10 +6122,10 @@
             </a:pathLst>
           </a:custGeom>
           <a:blipFill>
-            <a:blip r:embed="rId35">
+            <a:blip r:embed="rId30">
               <a:extLst>
                 <a:ext uri="{96DAC541-7B7A-43D3-8B79-37D633B846F1}">
-                  <asvg:svgBlip xmlns:asvg="http://schemas.microsoft.com/office/drawing/2016/SVG/main" r:embed="rId36"/>
+                  <asvg:svgBlip xmlns:asvg="http://schemas.microsoft.com/office/drawing/2016/SVG/main" r:embed="rId31"/>
                 </a:ext>
               </a:extLst>
             </a:blip>
@@ -6497,10 +6174,10 @@
             </a:pathLst>
           </a:custGeom>
           <a:blipFill>
-            <a:blip r:embed="rId37">
+            <a:blip r:embed="rId32">
               <a:extLst>
                 <a:ext uri="{96DAC541-7B7A-43D3-8B79-37D633B846F1}">
-                  <asvg:svgBlip xmlns:asvg="http://schemas.microsoft.com/office/drawing/2016/SVG/main" r:embed="rId38"/>
+                  <asvg:svgBlip xmlns:asvg="http://schemas.microsoft.com/office/drawing/2016/SVG/main" r:embed="rId33"/>
                 </a:ext>
               </a:extLst>
             </a:blip>
@@ -6509,121 +6186,6 @@
             </a:stretch>
           </a:blipFill>
         </p:spPr>
-      </p:sp>
-      <p:sp>
-        <p:nvSpPr>
-          <p:cNvPr id="82" name="Freeform 82"/>
-          <p:cNvSpPr/>
-          <p:nvPr/>
-        </p:nvSpPr>
-        <p:spPr>
-          <a:xfrm>
-            <a:off x="4797557" y="2400267"/>
-            <a:ext cx="1302412" cy="1488470"/>
-          </a:xfrm>
-          <a:custGeom>
-            <a:avLst/>
-            <a:gdLst/>
-            <a:ahLst/>
-            <a:cxnLst/>
-            <a:rect l="l" t="t" r="r" b="b"/>
-            <a:pathLst>
-              <a:path w="1302412" h="1488470">
-                <a:moveTo>
-                  <a:pt x="0" y="0"/>
-                </a:moveTo>
-                <a:lnTo>
-                  <a:pt x="1302411" y="0"/>
-                </a:lnTo>
-                <a:lnTo>
-                  <a:pt x="1302411" y="1488470"/>
-                </a:lnTo>
-                <a:lnTo>
-                  <a:pt x="0" y="1488470"/>
-                </a:lnTo>
-                <a:lnTo>
-                  <a:pt x="0" y="0"/>
-                </a:lnTo>
-                <a:close/>
-              </a:path>
-            </a:pathLst>
-          </a:custGeom>
-          <a:blipFill>
-            <a:blip r:embed="rId39">
-              <a:extLst>
-                <a:ext uri="{96DAC541-7B7A-43D3-8B79-37D633B846F1}">
-                  <asvg:svgBlip xmlns:asvg="http://schemas.microsoft.com/office/drawing/2016/SVG/main" r:embed="rId40"/>
-                </a:ext>
-              </a:extLst>
-            </a:blip>
-            <a:stretch>
-              <a:fillRect/>
-            </a:stretch>
-          </a:blipFill>
-        </p:spPr>
-      </p:sp>
-      <p:sp>
-        <p:nvSpPr>
-          <p:cNvPr id="83" name="TextBox 83"/>
-          <p:cNvSpPr txBox="1"/>
-          <p:nvPr/>
-        </p:nvSpPr>
-        <p:spPr>
-          <a:xfrm>
-            <a:off x="3127750" y="1080349"/>
-            <a:ext cx="1768650" cy="469956"/>
-          </a:xfrm>
-          <a:prstGeom prst="rect">
-            <a:avLst/>
-          </a:prstGeom>
-        </p:spPr>
-        <p:txBody>
-          <a:bodyPr lIns="0" tIns="0" rIns="0" bIns="0" rtlCol="0" anchor="t">
-            <a:spAutoFit/>
-          </a:bodyPr>
-          <a:lstStyle/>
-          <a:p>
-            <a:pPr algn="ctr">
-              <a:lnSpc>
-                <a:spcPts val="1921"/>
-              </a:lnSpc>
-            </a:pPr>
-            <a:r>
-              <a:rPr lang="en-US" sz="1372" b="1">
-                <a:solidFill>
-                  <a:srgbClr val="000000"/>
-                </a:solidFill>
-                <a:latin typeface="Open Sans Bold"/>
-                <a:ea typeface="Open Sans Bold"/>
-                <a:cs typeface="Open Sans Bold"/>
-                <a:sym typeface="Open Sans Bold"/>
-              </a:rPr>
-              <a:t>Sensor Ultrassônico </a:t>
-            </a:r>
-          </a:p>
-          <a:p>
-            <a:pPr algn="ctr">
-              <a:lnSpc>
-                <a:spcPts val="1921"/>
-              </a:lnSpc>
-              <a:spcBef>
-                <a:spcPct val="0"/>
-              </a:spcBef>
-            </a:pPr>
-            <a:r>
-              <a:rPr lang="en-US" sz="1372" b="1">
-                <a:solidFill>
-                  <a:srgbClr val="000000"/>
-                </a:solidFill>
-                <a:latin typeface="Open Sans Bold"/>
-                <a:ea typeface="Open Sans Bold"/>
-                <a:cs typeface="Open Sans Bold"/>
-                <a:sym typeface="Open Sans Bold"/>
-              </a:rPr>
-              <a:t>HC SR04</a:t>
-            </a:r>
-          </a:p>
-        </p:txBody>
       </p:sp>
       <p:sp>
         <p:nvSpPr>
@@ -6669,47 +6231,229 @@
           </a:p>
         </p:txBody>
       </p:sp>
-      <p:sp>
-        <p:nvSpPr>
-          <p:cNvPr id="85" name="TextBox 85"/>
-          <p:cNvSpPr txBox="1"/>
+      <p:grpSp>
+        <p:nvGrpSpPr>
+          <p:cNvPr id="80" name="Agrupar 79">
+            <a:extLst>
+              <a:ext uri="{FF2B5EF4-FFF2-40B4-BE49-F238E27FC236}">
+                <a16:creationId xmlns:a16="http://schemas.microsoft.com/office/drawing/2014/main" id="{CE7F38DD-E3F8-4011-97AD-41DF0D61B481}"/>
+              </a:ext>
+            </a:extLst>
+          </p:cNvPr>
+          <p:cNvGrpSpPr/>
           <p:nvPr/>
-        </p:nvSpPr>
-        <p:spPr>
+        </p:nvGrpSpPr>
+        <p:grpSpPr>
           <a:xfrm>
-            <a:off x="9468550" y="3554483"/>
-            <a:ext cx="1177928" cy="550557"/>
+            <a:off x="9097255" y="6158887"/>
+            <a:ext cx="1907215" cy="1831841"/>
+            <a:chOff x="9153472" y="3416982"/>
+            <a:chExt cx="1907215" cy="1831841"/>
           </a:xfrm>
-          <a:prstGeom prst="rect">
-            <a:avLst/>
-          </a:prstGeom>
-        </p:spPr>
-        <p:txBody>
-          <a:bodyPr lIns="0" tIns="0" rIns="0" bIns="0" rtlCol="0" anchor="t">
-            <a:spAutoFit/>
-          </a:bodyPr>
-          <a:lstStyle/>
-          <a:p>
-            <a:pPr algn="ctr">
-              <a:lnSpc>
-                <a:spcPts val="2203"/>
-              </a:lnSpc>
-            </a:pPr>
-            <a:r>
-              <a:rPr lang="en-US" sz="1574" b="1" dirty="0">
+        </p:grpSpPr>
+        <p:grpSp>
+          <p:nvGrpSpPr>
+            <p:cNvPr id="41" name="Group 41"/>
+            <p:cNvGrpSpPr/>
+            <p:nvPr/>
+          </p:nvGrpSpPr>
+          <p:grpSpPr>
+            <a:xfrm>
+              <a:off x="9153472" y="3416982"/>
+              <a:ext cx="1907215" cy="1831841"/>
+              <a:chOff x="0" y="0"/>
+              <a:chExt cx="672031" cy="655417"/>
+            </a:xfrm>
+          </p:grpSpPr>
+          <p:sp>
+            <p:nvSpPr>
+              <p:cNvPr id="42" name="Freeform 42"/>
+              <p:cNvSpPr/>
+              <p:nvPr/>
+            </p:nvSpPr>
+            <p:spPr>
+              <a:xfrm>
+                <a:off x="0" y="0"/>
+                <a:ext cx="672031" cy="655417"/>
+              </a:xfrm>
+              <a:custGeom>
+                <a:avLst/>
+                <a:gdLst/>
+                <a:ahLst/>
+                <a:cxnLst/>
+                <a:rect l="l" t="t" r="r" b="b"/>
+                <a:pathLst>
+                  <a:path w="672031" h="655417">
+                    <a:moveTo>
+                      <a:pt x="81186" y="0"/>
+                    </a:moveTo>
+                    <a:lnTo>
+                      <a:pt x="590845" y="0"/>
+                    </a:lnTo>
+                    <a:cubicBezTo>
+                      <a:pt x="635683" y="0"/>
+                      <a:pt x="672031" y="36348"/>
+                      <a:pt x="672031" y="81186"/>
+                    </a:cubicBezTo>
+                    <a:lnTo>
+                      <a:pt x="672031" y="574231"/>
+                    </a:lnTo>
+                    <a:cubicBezTo>
+                      <a:pt x="672031" y="619069"/>
+                      <a:pt x="635683" y="655417"/>
+                      <a:pt x="590845" y="655417"/>
+                    </a:cubicBezTo>
+                    <a:lnTo>
+                      <a:pt x="81186" y="655417"/>
+                    </a:lnTo>
+                    <a:cubicBezTo>
+                      <a:pt x="36348" y="655417"/>
+                      <a:pt x="0" y="619069"/>
+                      <a:pt x="0" y="574231"/>
+                    </a:cubicBezTo>
+                    <a:lnTo>
+                      <a:pt x="0" y="81186"/>
+                    </a:lnTo>
+                    <a:cubicBezTo>
+                      <a:pt x="0" y="36348"/>
+                      <a:pt x="36348" y="0"/>
+                      <a:pt x="81186" y="0"/>
+                    </a:cubicBezTo>
+                    <a:close/>
+                  </a:path>
+                </a:pathLst>
+              </a:custGeom>
+              <a:solidFill>
+                <a:srgbClr val="000000">
+                  <a:alpha val="0"/>
+                </a:srgbClr>
+              </a:solidFill>
+              <a:ln w="38100" cap="sq">
                 <a:solidFill>
                   <a:srgbClr val="000000"/>
                 </a:solidFill>
-                <a:latin typeface="Open Sans Bold"/>
-                <a:ea typeface="Open Sans Bold"/>
-                <a:cs typeface="Open Sans Bold"/>
-                <a:sym typeface="Open Sans Bold"/>
-              </a:rPr>
-              <a:t>Banco de Dados</a:t>
-            </a:r>
-          </a:p>
-        </p:txBody>
-      </p:sp>
+                <a:prstDash val="solid"/>
+                <a:miter/>
+              </a:ln>
+            </p:spPr>
+          </p:sp>
+          <p:sp>
+            <p:nvSpPr>
+              <p:cNvPr id="43" name="TextBox 43"/>
+              <p:cNvSpPr txBox="1"/>
+              <p:nvPr/>
+            </p:nvSpPr>
+            <p:spPr>
+              <a:xfrm>
+                <a:off x="0" y="-38100"/>
+                <a:ext cx="672031" cy="693517"/>
+              </a:xfrm>
+              <a:prstGeom prst="rect">
+                <a:avLst/>
+              </a:prstGeom>
+            </p:spPr>
+            <p:txBody>
+              <a:bodyPr lIns="51196" tIns="51196" rIns="51196" bIns="51196" rtlCol="0" anchor="ctr"/>
+              <a:lstStyle/>
+              <a:p>
+                <a:pPr algn="ctr">
+                  <a:lnSpc>
+                    <a:spcPts val="2966"/>
+                  </a:lnSpc>
+                </a:pPr>
+                <a:endParaRPr/>
+              </a:p>
+            </p:txBody>
+          </p:sp>
+        </p:grpSp>
+        <p:sp>
+          <p:nvSpPr>
+            <p:cNvPr id="44" name="Freeform 44"/>
+            <p:cNvSpPr/>
+            <p:nvPr/>
+          </p:nvSpPr>
+          <p:spPr>
+            <a:xfrm>
+              <a:off x="9606635" y="4208365"/>
+              <a:ext cx="942728" cy="942728"/>
+            </a:xfrm>
+            <a:custGeom>
+              <a:avLst/>
+              <a:gdLst/>
+              <a:ahLst/>
+              <a:cxnLst/>
+              <a:rect l="l" t="t" r="r" b="b"/>
+              <a:pathLst>
+                <a:path w="942728" h="942728">
+                  <a:moveTo>
+                    <a:pt x="0" y="0"/>
+                  </a:moveTo>
+                  <a:lnTo>
+                    <a:pt x="942729" y="0"/>
+                  </a:lnTo>
+                  <a:lnTo>
+                    <a:pt x="942729" y="942728"/>
+                  </a:lnTo>
+                  <a:lnTo>
+                    <a:pt x="0" y="942728"/>
+                  </a:lnTo>
+                  <a:lnTo>
+                    <a:pt x="0" y="0"/>
+                  </a:lnTo>
+                  <a:close/>
+                </a:path>
+              </a:pathLst>
+            </a:custGeom>
+            <a:blipFill>
+              <a:blip r:embed="rId34"/>
+              <a:stretch>
+                <a:fillRect/>
+              </a:stretch>
+            </a:blipFill>
+          </p:spPr>
+        </p:sp>
+        <p:sp>
+          <p:nvSpPr>
+            <p:cNvPr id="85" name="TextBox 85"/>
+            <p:cNvSpPr txBox="1"/>
+            <p:nvPr/>
+          </p:nvSpPr>
+          <p:spPr>
+            <a:xfrm>
+              <a:off x="9468550" y="3554483"/>
+              <a:ext cx="1177928" cy="550557"/>
+            </a:xfrm>
+            <a:prstGeom prst="rect">
+              <a:avLst/>
+            </a:prstGeom>
+          </p:spPr>
+          <p:txBody>
+            <a:bodyPr lIns="0" tIns="0" rIns="0" bIns="0" rtlCol="0" anchor="t">
+              <a:spAutoFit/>
+            </a:bodyPr>
+            <a:lstStyle/>
+            <a:p>
+              <a:pPr algn="ctr">
+                <a:lnSpc>
+                  <a:spcPts val="2203"/>
+                </a:lnSpc>
+              </a:pPr>
+              <a:r>
+                <a:rPr lang="en-US" sz="1574" b="1" dirty="0">
+                  <a:solidFill>
+                    <a:srgbClr val="000000"/>
+                  </a:solidFill>
+                  <a:latin typeface="Open Sans Bold"/>
+                  <a:ea typeface="Open Sans Bold"/>
+                  <a:cs typeface="Open Sans Bold"/>
+                  <a:sym typeface="Open Sans Bold"/>
+                </a:rPr>
+                <a:t>Banco de Dados</a:t>
+              </a:r>
+            </a:p>
+          </p:txBody>
+        </p:sp>
+      </p:grpSp>
       <p:sp>
         <p:nvSpPr>
           <p:cNvPr id="86" name="TextBox 86"/>
@@ -6718,7 +6462,7 @@
         </p:nvSpPr>
         <p:spPr>
           <a:xfrm>
-            <a:off x="9691743" y="2100097"/>
+            <a:off x="9789884" y="2114550"/>
             <a:ext cx="973366" cy="216099"/>
           </a:xfrm>
           <a:prstGeom prst="rect">
@@ -6740,7 +6484,7 @@
               </a:spcBef>
             </a:pPr>
             <a:r>
-              <a:rPr lang="en-US" sz="1249" b="1">
+              <a:rPr lang="en-US" sz="1249" b="1" dirty="0">
                 <a:solidFill>
                   <a:srgbClr val="000000"/>
                 </a:solidFill>
@@ -6968,10 +6712,10 @@
               </a:pathLst>
             </a:custGeom>
             <a:blipFill>
-              <a:blip r:embed="rId41">
+              <a:blip r:embed="rId35">
                 <a:extLst>
                   <a:ext uri="{96DAC541-7B7A-43D3-8B79-37D633B846F1}">
-                    <asvg:svgBlip xmlns:asvg="http://schemas.microsoft.com/office/drawing/2016/SVG/main" r:embed="rId42"/>
+                    <asvg:svgBlip xmlns:asvg="http://schemas.microsoft.com/office/drawing/2016/SVG/main" r:embed="rId36"/>
                   </a:ext>
                 </a:extLst>
               </a:blip>
@@ -7158,50 +6902,290 @@
           </a:p>
         </p:txBody>
       </p:sp>
-      <p:sp>
-        <p:nvSpPr>
-          <p:cNvPr id="94" name="TextBox 94"/>
-          <p:cNvSpPr txBox="1"/>
+      <p:grpSp>
+        <p:nvGrpSpPr>
+          <p:cNvPr id="97" name="Agrupar 96">
+            <a:extLst>
+              <a:ext uri="{FF2B5EF4-FFF2-40B4-BE49-F238E27FC236}">
+                <a16:creationId xmlns:a16="http://schemas.microsoft.com/office/drawing/2014/main" id="{964AD309-FAE4-4ED5-A3E8-20D0369041F8}"/>
+              </a:ext>
+            </a:extLst>
+          </p:cNvPr>
+          <p:cNvGrpSpPr/>
           <p:nvPr/>
-        </p:nvSpPr>
-        <p:spPr>
+        </p:nvGrpSpPr>
+        <p:grpSpPr>
           <a:xfrm>
-            <a:off x="4936301" y="3913968"/>
-            <a:ext cx="1161101" cy="235352"/>
+            <a:off x="4133850" y="958794"/>
+            <a:ext cx="1768650" cy="3190526"/>
+            <a:chOff x="4651200" y="958794"/>
+            <a:chExt cx="1768650" cy="3190526"/>
           </a:xfrm>
-          <a:prstGeom prst="rect">
-            <a:avLst/>
-          </a:prstGeom>
-        </p:spPr>
-        <p:txBody>
-          <a:bodyPr lIns="0" tIns="0" rIns="0" bIns="0" rtlCol="0" anchor="t">
-            <a:spAutoFit/>
-          </a:bodyPr>
-          <a:lstStyle/>
-          <a:p>
-            <a:pPr algn="just">
-              <a:lnSpc>
-                <a:spcPts val="1921"/>
-              </a:lnSpc>
-              <a:spcBef>
-                <a:spcPct val="0"/>
-              </a:spcBef>
-            </a:pPr>
-            <a:r>
-              <a:rPr lang="en-US" sz="1372" b="1" dirty="0">
-                <a:solidFill>
-                  <a:srgbClr val="000000"/>
-                </a:solidFill>
-                <a:latin typeface="Open Sans Bold"/>
-                <a:ea typeface="Open Sans Bold"/>
-                <a:cs typeface="Open Sans Bold"/>
-                <a:sym typeface="Open Sans Bold"/>
-              </a:rPr>
-              <a:t>Reservatório</a:t>
-            </a:r>
-          </a:p>
-        </p:txBody>
-      </p:sp>
+        </p:grpSpPr>
+        <p:sp>
+          <p:nvSpPr>
+            <p:cNvPr id="14" name="Freeform 14"/>
+            <p:cNvSpPr/>
+            <p:nvPr/>
+          </p:nvSpPr>
+          <p:spPr>
+            <a:xfrm>
+              <a:off x="5019059" y="1400981"/>
+              <a:ext cx="1019791" cy="637369"/>
+            </a:xfrm>
+            <a:custGeom>
+              <a:avLst/>
+              <a:gdLst/>
+              <a:ahLst/>
+              <a:cxnLst/>
+              <a:rect l="l" t="t" r="r" b="b"/>
+              <a:pathLst>
+                <a:path w="1019791" h="637369">
+                  <a:moveTo>
+                    <a:pt x="0" y="0"/>
+                  </a:moveTo>
+                  <a:lnTo>
+                    <a:pt x="1019791" y="0"/>
+                  </a:lnTo>
+                  <a:lnTo>
+                    <a:pt x="1019791" y="637369"/>
+                  </a:lnTo>
+                  <a:lnTo>
+                    <a:pt x="0" y="637369"/>
+                  </a:lnTo>
+                  <a:lnTo>
+                    <a:pt x="0" y="0"/>
+                  </a:lnTo>
+                  <a:close/>
+                </a:path>
+              </a:pathLst>
+            </a:custGeom>
+            <a:blipFill>
+              <a:blip r:embed="rId37">
+                <a:extLst>
+                  <a:ext uri="{96DAC541-7B7A-43D3-8B79-37D633B846F1}">
+                    <asvg:svgBlip xmlns:asvg="http://schemas.microsoft.com/office/drawing/2016/SVG/main" r:embed="rId38"/>
+                  </a:ext>
+                </a:extLst>
+              </a:blip>
+              <a:stretch>
+                <a:fillRect/>
+              </a:stretch>
+            </a:blipFill>
+          </p:spPr>
+        </p:sp>
+        <p:sp>
+          <p:nvSpPr>
+            <p:cNvPr id="15" name="Freeform 15"/>
+            <p:cNvSpPr/>
+            <p:nvPr/>
+          </p:nvSpPr>
+          <p:spPr>
+            <a:xfrm rot="5400000">
+              <a:off x="5330962" y="1969046"/>
+              <a:ext cx="427510" cy="625498"/>
+            </a:xfrm>
+            <a:custGeom>
+              <a:avLst/>
+              <a:gdLst/>
+              <a:ahLst/>
+              <a:cxnLst/>
+              <a:rect l="l" t="t" r="r" b="b"/>
+              <a:pathLst>
+                <a:path w="476141" h="817409">
+                  <a:moveTo>
+                    <a:pt x="0" y="0"/>
+                  </a:moveTo>
+                  <a:lnTo>
+                    <a:pt x="476141" y="0"/>
+                  </a:lnTo>
+                  <a:lnTo>
+                    <a:pt x="476141" y="817410"/>
+                  </a:lnTo>
+                  <a:lnTo>
+                    <a:pt x="0" y="817410"/>
+                  </a:lnTo>
+                  <a:lnTo>
+                    <a:pt x="0" y="0"/>
+                  </a:lnTo>
+                  <a:close/>
+                </a:path>
+              </a:pathLst>
+            </a:custGeom>
+            <a:blipFill>
+              <a:blip r:embed="rId39">
+                <a:extLst>
+                  <a:ext uri="{96DAC541-7B7A-43D3-8B79-37D633B846F1}">
+                    <asvg:svgBlip xmlns:asvg="http://schemas.microsoft.com/office/drawing/2016/SVG/main" r:embed="rId40"/>
+                  </a:ext>
+                </a:extLst>
+              </a:blip>
+              <a:stretch>
+                <a:fillRect/>
+              </a:stretch>
+            </a:blipFill>
+          </p:spPr>
+        </p:sp>
+        <p:sp>
+          <p:nvSpPr>
+            <p:cNvPr id="82" name="Freeform 82"/>
+            <p:cNvSpPr/>
+            <p:nvPr/>
+          </p:nvSpPr>
+          <p:spPr>
+            <a:xfrm>
+              <a:off x="4936301" y="2523435"/>
+              <a:ext cx="1163668" cy="1365302"/>
+            </a:xfrm>
+            <a:custGeom>
+              <a:avLst/>
+              <a:gdLst/>
+              <a:ahLst/>
+              <a:cxnLst/>
+              <a:rect l="l" t="t" r="r" b="b"/>
+              <a:pathLst>
+                <a:path w="1302412" h="1488470">
+                  <a:moveTo>
+                    <a:pt x="0" y="0"/>
+                  </a:moveTo>
+                  <a:lnTo>
+                    <a:pt x="1302411" y="0"/>
+                  </a:lnTo>
+                  <a:lnTo>
+                    <a:pt x="1302411" y="1488470"/>
+                  </a:lnTo>
+                  <a:lnTo>
+                    <a:pt x="0" y="1488470"/>
+                  </a:lnTo>
+                  <a:lnTo>
+                    <a:pt x="0" y="0"/>
+                  </a:lnTo>
+                  <a:close/>
+                </a:path>
+              </a:pathLst>
+            </a:custGeom>
+            <a:blipFill>
+              <a:blip r:embed="rId41">
+                <a:extLst>
+                  <a:ext uri="{96DAC541-7B7A-43D3-8B79-37D633B846F1}">
+                    <asvg:svgBlip xmlns:asvg="http://schemas.microsoft.com/office/drawing/2016/SVG/main" r:embed="rId42"/>
+                  </a:ext>
+                </a:extLst>
+              </a:blip>
+              <a:stretch>
+                <a:fillRect/>
+              </a:stretch>
+            </a:blipFill>
+          </p:spPr>
+        </p:sp>
+        <p:sp>
+          <p:nvSpPr>
+            <p:cNvPr id="83" name="TextBox 83"/>
+            <p:cNvSpPr txBox="1"/>
+            <p:nvPr/>
+          </p:nvSpPr>
+          <p:spPr>
+            <a:xfrm>
+              <a:off x="4651200" y="958794"/>
+              <a:ext cx="1768650" cy="469956"/>
+            </a:xfrm>
+            <a:prstGeom prst="rect">
+              <a:avLst/>
+            </a:prstGeom>
+          </p:spPr>
+          <p:txBody>
+            <a:bodyPr lIns="0" tIns="0" rIns="0" bIns="0" rtlCol="0" anchor="t">
+              <a:spAutoFit/>
+            </a:bodyPr>
+            <a:lstStyle/>
+            <a:p>
+              <a:pPr algn="ctr">
+                <a:lnSpc>
+                  <a:spcPts val="1921"/>
+                </a:lnSpc>
+              </a:pPr>
+              <a:r>
+                <a:rPr lang="en-US" sz="1372" b="1" dirty="0">
+                  <a:solidFill>
+                    <a:srgbClr val="000000"/>
+                  </a:solidFill>
+                  <a:latin typeface="Open Sans Bold"/>
+                  <a:ea typeface="Open Sans Bold"/>
+                  <a:cs typeface="Open Sans Bold"/>
+                  <a:sym typeface="Open Sans Bold"/>
+                </a:rPr>
+                <a:t>Sensor Ultrassônico </a:t>
+              </a:r>
+            </a:p>
+            <a:p>
+              <a:pPr algn="ctr">
+                <a:lnSpc>
+                  <a:spcPts val="1921"/>
+                </a:lnSpc>
+                <a:spcBef>
+                  <a:spcPct val="0"/>
+                </a:spcBef>
+              </a:pPr>
+              <a:r>
+                <a:rPr lang="en-US" sz="1372" b="1" dirty="0">
+                  <a:solidFill>
+                    <a:srgbClr val="000000"/>
+                  </a:solidFill>
+                  <a:latin typeface="Open Sans Bold"/>
+                  <a:ea typeface="Open Sans Bold"/>
+                  <a:cs typeface="Open Sans Bold"/>
+                  <a:sym typeface="Open Sans Bold"/>
+                </a:rPr>
+                <a:t>HC SR04</a:t>
+              </a:r>
+            </a:p>
+          </p:txBody>
+        </p:sp>
+        <p:sp>
+          <p:nvSpPr>
+            <p:cNvPr id="94" name="TextBox 94"/>
+            <p:cNvSpPr txBox="1"/>
+            <p:nvPr/>
+          </p:nvSpPr>
+          <p:spPr>
+            <a:xfrm>
+              <a:off x="4936301" y="3913968"/>
+              <a:ext cx="1161101" cy="235352"/>
+            </a:xfrm>
+            <a:prstGeom prst="rect">
+              <a:avLst/>
+            </a:prstGeom>
+          </p:spPr>
+          <p:txBody>
+            <a:bodyPr lIns="0" tIns="0" rIns="0" bIns="0" rtlCol="0" anchor="t">
+              <a:spAutoFit/>
+            </a:bodyPr>
+            <a:lstStyle/>
+            <a:p>
+              <a:pPr algn="just">
+                <a:lnSpc>
+                  <a:spcPts val="1921"/>
+                </a:lnSpc>
+                <a:spcBef>
+                  <a:spcPct val="0"/>
+                </a:spcBef>
+              </a:pPr>
+              <a:r>
+                <a:rPr lang="en-US" sz="1372" b="1" dirty="0">
+                  <a:solidFill>
+                    <a:srgbClr val="000000"/>
+                  </a:solidFill>
+                  <a:latin typeface="Open Sans Bold"/>
+                  <a:ea typeface="Open Sans Bold"/>
+                  <a:cs typeface="Open Sans Bold"/>
+                  <a:sym typeface="Open Sans Bold"/>
+                </a:rPr>
+                <a:t>Reservatório</a:t>
+              </a:r>
+            </a:p>
+          </p:txBody>
+        </p:sp>
+      </p:grpSp>
       <p:cxnSp>
         <p:nvCxnSpPr>
           <p:cNvPr id="96" name="Conector: Angulado 95">
@@ -7292,7 +7276,7 @@
         </p:nvSpPr>
         <p:spPr>
           <a:xfrm>
-            <a:off x="16395072" y="3943350"/>
+            <a:off x="16394594" y="3942277"/>
             <a:ext cx="1710869" cy="562526"/>
           </a:xfrm>
           <a:prstGeom prst="rect">
@@ -7343,7 +7327,7 @@
         <p:spPr>
           <a:xfrm>
             <a:off x="11756442" y="1793053"/>
-            <a:ext cx="1177928" cy="545855"/>
+            <a:ext cx="1177928" cy="263727"/>
           </a:xfrm>
           <a:prstGeom prst="rect">
             <a:avLst/>
@@ -7360,68 +7344,15 @@
                 <a:spcPts val="2203"/>
               </a:lnSpc>
             </a:pPr>
-            <a:r>
-              <a:rPr lang="en-US" sz="1574" b="1" dirty="0">
-                <a:solidFill>
-                  <a:srgbClr val="000000"/>
-                </a:solidFill>
-                <a:latin typeface="Open Sans Bold"/>
-                <a:ea typeface="Open Sans Bold"/>
-                <a:cs typeface="Open Sans Bold"/>
-                <a:sym typeface="Open Sans Bold"/>
-              </a:rPr>
-              <a:t>Máquina Virtual</a:t>
-            </a:r>
-          </a:p>
-        </p:txBody>
-      </p:sp>
-      <p:sp>
-        <p:nvSpPr>
-          <p:cNvPr id="103" name="TextBox 93">
-            <a:extLst>
-              <a:ext uri="{FF2B5EF4-FFF2-40B4-BE49-F238E27FC236}">
-                <a16:creationId xmlns:a16="http://schemas.microsoft.com/office/drawing/2014/main" id="{D7B99AFE-3575-47DA-AA3D-31525BBA56B6}"/>
-              </a:ext>
-            </a:extLst>
-          </p:cNvPr>
-          <p:cNvSpPr txBox="1"/>
-          <p:nvPr/>
-        </p:nvSpPr>
-        <p:spPr>
-          <a:xfrm>
-            <a:off x="9522423" y="6229350"/>
-            <a:ext cx="2002827" cy="471531"/>
-          </a:xfrm>
-          <a:prstGeom prst="rect">
-            <a:avLst/>
-          </a:prstGeom>
-        </p:spPr>
-        <p:txBody>
-          <a:bodyPr wrap="square" lIns="0" tIns="0" rIns="0" bIns="0" rtlCol="0" anchor="t">
-            <a:spAutoFit/>
-          </a:bodyPr>
-          <a:lstStyle/>
-          <a:p>
-            <a:pPr algn="ctr">
-              <a:lnSpc>
-                <a:spcPts val="4672"/>
-              </a:lnSpc>
-              <a:spcBef>
-                <a:spcPct val="0"/>
-              </a:spcBef>
-            </a:pPr>
-            <a:r>
-              <a:rPr lang="en-US" dirty="0">
-                <a:solidFill>
-                  <a:srgbClr val="000000"/>
-                </a:solidFill>
-                <a:latin typeface="Open Sans"/>
-                <a:ea typeface="Open Sans"/>
-                <a:cs typeface="Open Sans"/>
-                <a:sym typeface="Open Sans"/>
-              </a:rPr>
-              <a:t>Api Clima</a:t>
-            </a:r>
+            <a:endParaRPr lang="en-US" sz="1574" b="1" dirty="0">
+              <a:solidFill>
+                <a:srgbClr val="000000"/>
+              </a:solidFill>
+              <a:latin typeface="Open Sans Bold"/>
+              <a:ea typeface="Open Sans Bold"/>
+              <a:cs typeface="Open Sans Bold"/>
+              <a:sym typeface="Open Sans Bold"/>
+            </a:endParaRPr>
           </a:p>
         </p:txBody>
       </p:sp>
@@ -7438,8 +7369,8 @@
           <p:nvPr/>
         </p:nvSpPr>
         <p:spPr>
-          <a:xfrm rot="16200000">
-            <a:off x="9850758" y="5811795"/>
+          <a:xfrm rot="5400000">
+            <a:off x="9896371" y="5585861"/>
             <a:ext cx="514010" cy="129921"/>
           </a:xfrm>
           <a:custGeom>
@@ -7470,10 +7401,10 @@
             </a:pathLst>
           </a:custGeom>
           <a:blipFill>
-            <a:blip r:embed="rId33">
+            <a:blip r:embed="rId28">
               <a:extLst>
                 <a:ext uri="{96DAC541-7B7A-43D3-8B79-37D633B846F1}">
-                  <asvg:svgBlip xmlns:asvg="http://schemas.microsoft.com/office/drawing/2016/SVG/main" r:embed="rId34"/>
+                  <asvg:svgBlip xmlns:asvg="http://schemas.microsoft.com/office/drawing/2016/SVG/main" r:embed="rId29"/>
                 </a:ext>
               </a:extLst>
             </a:blip>
@@ -7497,7 +7428,7 @@
         </p:nvSpPr>
         <p:spPr>
           <a:xfrm>
-            <a:off x="9265084" y="7097367"/>
+            <a:off x="9140119" y="3531946"/>
             <a:ext cx="1892983" cy="1628224"/>
           </a:xfrm>
           <a:prstGeom prst="roundRect">
@@ -7533,71 +7464,12 @@
           </a:p>
         </p:txBody>
       </p:sp>
-      <p:sp>
-        <p:nvSpPr>
-          <p:cNvPr id="111" name="TextBox 93">
+      <p:grpSp>
+        <p:nvGrpSpPr>
+          <p:cNvPr id="68" name="Agrupar 67">
             <a:extLst>
               <a:ext uri="{FF2B5EF4-FFF2-40B4-BE49-F238E27FC236}">
-                <a16:creationId xmlns:a16="http://schemas.microsoft.com/office/drawing/2014/main" id="{857A3E5C-BF8C-4E7F-8680-7B353ABD52F3}"/>
-              </a:ext>
-            </a:extLst>
-          </p:cNvPr>
-          <p:cNvSpPr txBox="1"/>
-          <p:nvPr/>
-        </p:nvSpPr>
-        <p:spPr>
-          <a:xfrm>
-            <a:off x="9838176" y="6492301"/>
-            <a:ext cx="1687074" cy="505075"/>
-          </a:xfrm>
-          <a:prstGeom prst="rect">
-            <a:avLst/>
-          </a:prstGeom>
-        </p:spPr>
-        <p:txBody>
-          <a:bodyPr wrap="square" lIns="0" tIns="0" rIns="0" bIns="0" rtlCol="0" anchor="t">
-            <a:spAutoFit/>
-          </a:bodyPr>
-          <a:lstStyle/>
-          <a:p>
-            <a:pPr algn="ctr">
-              <a:lnSpc>
-                <a:spcPts val="4672"/>
-              </a:lnSpc>
-              <a:spcBef>
-                <a:spcPct val="0"/>
-              </a:spcBef>
-            </a:pPr>
-            <a:r>
-              <a:rPr lang="en-US" sz="1600" b="1" dirty="0">
-                <a:solidFill>
-                  <a:srgbClr val="000000"/>
-                </a:solidFill>
-                <a:latin typeface="Open Sans"/>
-                <a:ea typeface="Open Sans"/>
-                <a:cs typeface="Open Sans"/>
-                <a:sym typeface="Open Sans"/>
-              </a:rPr>
-              <a:t>H G WEATHER</a:t>
-            </a:r>
-            <a:endParaRPr lang="en-US" sz="1200" b="1" dirty="0">
-              <a:solidFill>
-                <a:srgbClr val="000000"/>
-              </a:solidFill>
-              <a:latin typeface="Open Sans"/>
-              <a:ea typeface="Open Sans"/>
-              <a:cs typeface="Open Sans"/>
-              <a:sym typeface="Open Sans"/>
-            </a:endParaRPr>
-          </a:p>
-        </p:txBody>
-      </p:sp>
-      <p:grpSp>
-        <p:nvGrpSpPr>
-          <p:cNvPr id="120" name="Group 31">
-            <a:extLst>
-              <a:ext uri="{FF2B5EF4-FFF2-40B4-BE49-F238E27FC236}">
-                <a16:creationId xmlns:a16="http://schemas.microsoft.com/office/drawing/2014/main" id="{8BF383A8-CEE7-4669-926A-FF36413DDADC}"/>
+                <a16:creationId xmlns:a16="http://schemas.microsoft.com/office/drawing/2014/main" id="{FB869D39-797C-425C-9F0B-AD50C5C040D1}"/>
               </a:ext>
             </a:extLst>
           </p:cNvPr>
@@ -7606,28 +7478,152 @@
         </p:nvGrpSpPr>
         <p:grpSpPr>
           <a:xfrm>
-            <a:off x="9391650" y="7058575"/>
-            <a:ext cx="3226624" cy="1503620"/>
-            <a:chOff x="-695977" y="-38100"/>
-            <a:chExt cx="1425198" cy="829135"/>
+            <a:off x="9271606" y="2647950"/>
+            <a:ext cx="2013501" cy="749934"/>
+            <a:chOff x="7906914" y="2505243"/>
+            <a:chExt cx="2013501" cy="749934"/>
           </a:xfrm>
         </p:grpSpPr>
         <p:sp>
           <p:nvSpPr>
-            <p:cNvPr id="121" name="Freeform 32">
+            <p:cNvPr id="103" name="TextBox 93">
               <a:extLst>
                 <a:ext uri="{FF2B5EF4-FFF2-40B4-BE49-F238E27FC236}">
-                  <a16:creationId xmlns:a16="http://schemas.microsoft.com/office/drawing/2014/main" id="{23EA32D5-6E48-4C1B-8C87-807892D32295}"/>
+                  <a16:creationId xmlns:a16="http://schemas.microsoft.com/office/drawing/2014/main" id="{D7B99AFE-3575-47DA-AA3D-31525BBA56B6}"/>
                 </a:ext>
               </a:extLst>
             </p:cNvPr>
+            <p:cNvSpPr txBox="1"/>
+            <p:nvPr/>
+          </p:nvSpPr>
+          <p:spPr>
+            <a:xfrm>
+              <a:off x="7906914" y="2505243"/>
+              <a:ext cx="2002827" cy="471531"/>
+            </a:xfrm>
+            <a:prstGeom prst="rect">
+              <a:avLst/>
+            </a:prstGeom>
+          </p:spPr>
+          <p:txBody>
+            <a:bodyPr wrap="square" lIns="0" tIns="0" rIns="0" bIns="0" rtlCol="0" anchor="t">
+              <a:spAutoFit/>
+            </a:bodyPr>
+            <a:lstStyle/>
+            <a:p>
+              <a:pPr algn="ctr">
+                <a:lnSpc>
+                  <a:spcPts val="4672"/>
+                </a:lnSpc>
+                <a:spcBef>
+                  <a:spcPct val="0"/>
+                </a:spcBef>
+              </a:pPr>
+              <a:r>
+                <a:rPr lang="en-US" dirty="0">
+                  <a:solidFill>
+                    <a:srgbClr val="000000"/>
+                  </a:solidFill>
+                  <a:latin typeface="Open Sans"/>
+                  <a:ea typeface="Open Sans"/>
+                  <a:cs typeface="Open Sans"/>
+                  <a:sym typeface="Open Sans"/>
+                </a:rPr>
+                <a:t>Api Clima</a:t>
+              </a:r>
+            </a:p>
+          </p:txBody>
+        </p:sp>
+        <p:sp>
+          <p:nvSpPr>
+            <p:cNvPr id="111" name="TextBox 93">
+              <a:extLst>
+                <a:ext uri="{FF2B5EF4-FFF2-40B4-BE49-F238E27FC236}">
+                  <a16:creationId xmlns:a16="http://schemas.microsoft.com/office/drawing/2014/main" id="{857A3E5C-BF8C-4E7F-8680-7B353ABD52F3}"/>
+                </a:ext>
+              </a:extLst>
+            </p:cNvPr>
+            <p:cNvSpPr txBox="1"/>
+            <p:nvPr/>
+          </p:nvSpPr>
+          <p:spPr>
+            <a:xfrm>
+              <a:off x="8233341" y="2750102"/>
+              <a:ext cx="1687074" cy="505075"/>
+            </a:xfrm>
+            <a:prstGeom prst="rect">
+              <a:avLst/>
+            </a:prstGeom>
+          </p:spPr>
+          <p:txBody>
+            <a:bodyPr wrap="square" lIns="0" tIns="0" rIns="0" bIns="0" rtlCol="0" anchor="t">
+              <a:spAutoFit/>
+            </a:bodyPr>
+            <a:lstStyle/>
+            <a:p>
+              <a:pPr algn="ctr">
+                <a:lnSpc>
+                  <a:spcPts val="4672"/>
+                </a:lnSpc>
+                <a:spcBef>
+                  <a:spcPct val="0"/>
+                </a:spcBef>
+              </a:pPr>
+              <a:r>
+                <a:rPr lang="en-US" sz="1600" b="1" dirty="0">
+                  <a:solidFill>
+                    <a:srgbClr val="000000"/>
+                  </a:solidFill>
+                  <a:latin typeface="Open Sans"/>
+                  <a:ea typeface="Open Sans"/>
+                  <a:cs typeface="Open Sans"/>
+                  <a:sym typeface="Open Sans"/>
+                </a:rPr>
+                <a:t>H G WEATHER</a:t>
+              </a:r>
+              <a:endParaRPr lang="en-US" sz="1200" b="1" dirty="0">
+                <a:solidFill>
+                  <a:srgbClr val="000000"/>
+                </a:solidFill>
+                <a:latin typeface="Open Sans"/>
+                <a:ea typeface="Open Sans"/>
+                <a:cs typeface="Open Sans"/>
+                <a:sym typeface="Open Sans"/>
+              </a:endParaRPr>
+            </a:p>
+          </p:txBody>
+        </p:sp>
+      </p:grpSp>
+      <p:grpSp>
+        <p:nvGrpSpPr>
+          <p:cNvPr id="95" name="Agrupar 94">
+            <a:extLst>
+              <a:ext uri="{FF2B5EF4-FFF2-40B4-BE49-F238E27FC236}">
+                <a16:creationId xmlns:a16="http://schemas.microsoft.com/office/drawing/2014/main" id="{59C15D87-26D7-43B8-B77E-7A4E2B60189D}"/>
+              </a:ext>
+            </a:extLst>
+          </p:cNvPr>
+          <p:cNvGrpSpPr/>
+          <p:nvPr/>
+        </p:nvGrpSpPr>
+        <p:grpSpPr>
+          <a:xfrm>
+            <a:off x="9289226" y="3486150"/>
+            <a:ext cx="3226624" cy="1500364"/>
+            <a:chOff x="9455622" y="3508235"/>
+            <a:chExt cx="3226624" cy="1503620"/>
+          </a:xfrm>
+        </p:grpSpPr>
+        <p:sp>
+          <p:nvSpPr>
+            <p:cNvPr id="63" name="Freeform 63"/>
             <p:cNvSpPr/>
             <p:nvPr/>
           </p:nvSpPr>
           <p:spPr>
             <a:xfrm>
-              <a:off x="-695977" y="50886"/>
-              <a:ext cx="729221" cy="740149"/>
+              <a:off x="9703216" y="3978207"/>
+              <a:ext cx="1116759" cy="580922"/>
             </a:xfrm>
             <a:custGeom>
               <a:avLst/>
@@ -7636,58 +7632,38 @@
               <a:cxnLst/>
               <a:rect l="l" t="t" r="r" b="b"/>
               <a:pathLst>
-                <a:path w="729221" h="740149">
+                <a:path w="2189333" h="613013">
                   <a:moveTo>
-                    <a:pt x="50141" y="0"/>
+                    <a:pt x="0" y="0"/>
                   </a:moveTo>
                   <a:lnTo>
-                    <a:pt x="679080" y="0"/>
-                  </a:lnTo>
-                  <a:cubicBezTo>
-                    <a:pt x="706772" y="0"/>
-                    <a:pt x="729221" y="22449"/>
-                    <a:pt x="729221" y="50141"/>
-                  </a:cubicBezTo>
-                  <a:lnTo>
-                    <a:pt x="729221" y="690008"/>
-                  </a:lnTo>
-                  <a:cubicBezTo>
-                    <a:pt x="729221" y="717700"/>
-                    <a:pt x="706772" y="740149"/>
-                    <a:pt x="679080" y="740149"/>
-                  </a:cubicBezTo>
-                  <a:lnTo>
-                    <a:pt x="50141" y="740149"/>
-                  </a:lnTo>
-                  <a:cubicBezTo>
-                    <a:pt x="22449" y="740149"/>
-                    <a:pt x="0" y="717700"/>
-                    <a:pt x="0" y="690008"/>
-                  </a:cubicBezTo>
-                  <a:lnTo>
-                    <a:pt x="0" y="50141"/>
-                  </a:lnTo>
-                  <a:cubicBezTo>
-                    <a:pt x="0" y="22449"/>
-                    <a:pt x="22449" y="0"/>
-                    <a:pt x="50141" y="0"/>
-                  </a:cubicBezTo>
+                    <a:pt x="2189334" y="0"/>
+                  </a:lnTo>
+                  <a:lnTo>
+                    <a:pt x="2189334" y="613013"/>
+                  </a:lnTo>
+                  <a:lnTo>
+                    <a:pt x="0" y="613013"/>
+                  </a:lnTo>
+                  <a:lnTo>
+                    <a:pt x="0" y="0"/>
+                  </a:lnTo>
                   <a:close/>
                 </a:path>
               </a:pathLst>
             </a:custGeom>
-            <a:solidFill>
-              <a:srgbClr val="000000">
-                <a:alpha val="0"/>
-              </a:srgbClr>
-            </a:solidFill>
-            <a:ln w="38100" cap="sq">
-              <a:solidFill>
-                <a:srgbClr val="000000"/>
-              </a:solidFill>
-              <a:prstDash val="solid"/>
-              <a:miter/>
-            </a:ln>
+            <a:blipFill>
+              <a:blip r:embed="rId12">
+                <a:extLst>
+                  <a:ext uri="{96DAC541-7B7A-43D3-8B79-37D633B846F1}">
+                    <asvg:svgBlip xmlns:asvg="http://schemas.microsoft.com/office/drawing/2016/SVG/main" r:embed="rId13"/>
+                  </a:ext>
+                </a:extLst>
+              </a:blip>
+              <a:stretch>
+                <a:fillRect/>
+              </a:stretch>
+            </a:blipFill>
           </p:spPr>
           <p:txBody>
             <a:bodyPr/>
@@ -7697,40 +7673,142 @@
             </a:p>
           </p:txBody>
         </p:sp>
-        <p:sp>
-          <p:nvSpPr>
-            <p:cNvPr id="122" name="TextBox 33">
+        <p:grpSp>
+          <p:nvGrpSpPr>
+            <p:cNvPr id="120" name="Group 31">
               <a:extLst>
                 <a:ext uri="{FF2B5EF4-FFF2-40B4-BE49-F238E27FC236}">
-                  <a16:creationId xmlns:a16="http://schemas.microsoft.com/office/drawing/2014/main" id="{13D1FD58-8258-42AB-AE9E-0FA4461B2230}"/>
+                  <a16:creationId xmlns:a16="http://schemas.microsoft.com/office/drawing/2014/main" id="{8BF383A8-CEE7-4669-926A-FF36413DDADC}"/>
                 </a:ext>
               </a:extLst>
             </p:cNvPr>
-            <p:cNvSpPr txBox="1"/>
+            <p:cNvGrpSpPr/>
             <p:nvPr/>
-          </p:nvSpPr>
-          <p:spPr>
+          </p:nvGrpSpPr>
+          <p:grpSpPr>
             <a:xfrm>
-              <a:off x="0" y="-38100"/>
-              <a:ext cx="729221" cy="778249"/>
+              <a:off x="9455622" y="3508235"/>
+              <a:ext cx="3226624" cy="1503620"/>
+              <a:chOff x="-695977" y="-38100"/>
+              <a:chExt cx="1425198" cy="829135"/>
             </a:xfrm>
-            <a:prstGeom prst="rect">
-              <a:avLst/>
-            </a:prstGeom>
-          </p:spPr>
-          <p:txBody>
-            <a:bodyPr lIns="56658" tIns="56658" rIns="56658" bIns="56658" rtlCol="0" anchor="ctr"/>
-            <a:lstStyle/>
-            <a:p>
-              <a:pPr algn="ctr">
-                <a:lnSpc>
-                  <a:spcPts val="2966"/>
-                </a:lnSpc>
-              </a:pPr>
-              <a:endParaRPr/>
-            </a:p>
-          </p:txBody>
-        </p:sp>
+          </p:grpSpPr>
+          <p:sp>
+            <p:nvSpPr>
+              <p:cNvPr id="121" name="Freeform 32">
+                <a:extLst>
+                  <a:ext uri="{FF2B5EF4-FFF2-40B4-BE49-F238E27FC236}">
+                    <a16:creationId xmlns:a16="http://schemas.microsoft.com/office/drawing/2014/main" id="{23EA32D5-6E48-4C1B-8C87-807892D32295}"/>
+                  </a:ext>
+                </a:extLst>
+              </p:cNvPr>
+              <p:cNvSpPr/>
+              <p:nvPr/>
+            </p:nvSpPr>
+            <p:spPr>
+              <a:xfrm>
+                <a:off x="-695977" y="50886"/>
+                <a:ext cx="729221" cy="740149"/>
+              </a:xfrm>
+              <a:custGeom>
+                <a:avLst/>
+                <a:gdLst/>
+                <a:ahLst/>
+                <a:cxnLst/>
+                <a:rect l="l" t="t" r="r" b="b"/>
+                <a:pathLst>
+                  <a:path w="729221" h="740149">
+                    <a:moveTo>
+                      <a:pt x="50141" y="0"/>
+                    </a:moveTo>
+                    <a:lnTo>
+                      <a:pt x="679080" y="0"/>
+                    </a:lnTo>
+                    <a:cubicBezTo>
+                      <a:pt x="706772" y="0"/>
+                      <a:pt x="729221" y="22449"/>
+                      <a:pt x="729221" y="50141"/>
+                    </a:cubicBezTo>
+                    <a:lnTo>
+                      <a:pt x="729221" y="690008"/>
+                    </a:lnTo>
+                    <a:cubicBezTo>
+                      <a:pt x="729221" y="717700"/>
+                      <a:pt x="706772" y="740149"/>
+                      <a:pt x="679080" y="740149"/>
+                    </a:cubicBezTo>
+                    <a:lnTo>
+                      <a:pt x="50141" y="740149"/>
+                    </a:lnTo>
+                    <a:cubicBezTo>
+                      <a:pt x="22449" y="740149"/>
+                      <a:pt x="0" y="717700"/>
+                      <a:pt x="0" y="690008"/>
+                    </a:cubicBezTo>
+                    <a:lnTo>
+                      <a:pt x="0" y="50141"/>
+                    </a:lnTo>
+                    <a:cubicBezTo>
+                      <a:pt x="0" y="22449"/>
+                      <a:pt x="22449" y="0"/>
+                      <a:pt x="50141" y="0"/>
+                    </a:cubicBezTo>
+                    <a:close/>
+                  </a:path>
+                </a:pathLst>
+              </a:custGeom>
+              <a:noFill/>
+              <a:ln w="38100" cap="sq">
+                <a:solidFill>
+                  <a:srgbClr val="000000"/>
+                </a:solidFill>
+                <a:prstDash val="solid"/>
+                <a:miter/>
+              </a:ln>
+            </p:spPr>
+            <p:txBody>
+              <a:bodyPr/>
+              <a:lstStyle/>
+              <a:p>
+                <a:endParaRPr lang="pt-BR" dirty="0"/>
+              </a:p>
+            </p:txBody>
+          </p:sp>
+          <p:sp>
+            <p:nvSpPr>
+              <p:cNvPr id="122" name="TextBox 33">
+                <a:extLst>
+                  <a:ext uri="{FF2B5EF4-FFF2-40B4-BE49-F238E27FC236}">
+                    <a16:creationId xmlns:a16="http://schemas.microsoft.com/office/drawing/2014/main" id="{13D1FD58-8258-42AB-AE9E-0FA4461B2230}"/>
+                  </a:ext>
+                </a:extLst>
+              </p:cNvPr>
+              <p:cNvSpPr txBox="1"/>
+              <p:nvPr/>
+            </p:nvSpPr>
+            <p:spPr>
+              <a:xfrm>
+                <a:off x="0" y="-38100"/>
+                <a:ext cx="729221" cy="778249"/>
+              </a:xfrm>
+              <a:prstGeom prst="rect">
+                <a:avLst/>
+              </a:prstGeom>
+            </p:spPr>
+            <p:txBody>
+              <a:bodyPr lIns="56658" tIns="56658" rIns="56658" bIns="56658" rtlCol="0" anchor="ctr"/>
+              <a:lstStyle/>
+              <a:p>
+                <a:pPr algn="ctr">
+                  <a:lnSpc>
+                    <a:spcPts val="2966"/>
+                  </a:lnSpc>
+                </a:pPr>
+                <a:endParaRPr/>
+              </a:p>
+            </p:txBody>
+          </p:sp>
+        </p:grpSp>
       </p:grpSp>
       <p:sp>
         <p:nvSpPr>
@@ -7746,7 +7824,7 @@
         </p:nvSpPr>
         <p:spPr>
           <a:xfrm>
-            <a:off x="9384093" y="6446443"/>
+            <a:off x="9136866" y="2851277"/>
             <a:ext cx="559584" cy="579130"/>
           </a:xfrm>
           <a:custGeom>
@@ -7777,10 +7855,10 @@
             </a:pathLst>
           </a:custGeom>
           <a:blipFill>
-            <a:blip r:embed="rId23">
+            <a:blip r:embed="rId18">
               <a:extLst>
                 <a:ext uri="{96DAC541-7B7A-43D3-8B79-37D633B846F1}">
-                  <asvg:svgBlip xmlns:asvg="http://schemas.microsoft.com/office/drawing/2016/SVG/main" r:embed="rId24"/>
+                  <asvg:svgBlip xmlns:asvg="http://schemas.microsoft.com/office/drawing/2016/SVG/main" r:embed="rId19"/>
                 </a:ext>
               </a:extLst>
             </a:blip>
@@ -7789,6 +7867,72 @@
             </a:stretch>
           </a:blipFill>
         </p:spPr>
+      </p:sp>
+      <p:sp>
+        <p:nvSpPr>
+          <p:cNvPr id="109" name="TextBox 93">
+            <a:extLst>
+              <a:ext uri="{FF2B5EF4-FFF2-40B4-BE49-F238E27FC236}">
+                <a16:creationId xmlns:a16="http://schemas.microsoft.com/office/drawing/2014/main" id="{E3530F48-C636-4140-92FB-9F92F7B746F2}"/>
+              </a:ext>
+            </a:extLst>
+          </p:cNvPr>
+          <p:cNvSpPr txBox="1"/>
+          <p:nvPr/>
+        </p:nvSpPr>
+        <p:spPr>
+          <a:xfrm>
+            <a:off x="10991850" y="1581150"/>
+            <a:ext cx="2565695" cy="615553"/>
+          </a:xfrm>
+          <a:prstGeom prst="rect">
+            <a:avLst/>
+          </a:prstGeom>
+        </p:spPr>
+        <p:txBody>
+          <a:bodyPr wrap="square" lIns="0" tIns="0" rIns="0" bIns="0" rtlCol="0" anchor="t">
+            <a:spAutoFit/>
+          </a:bodyPr>
+          <a:lstStyle/>
+          <a:p>
+            <a:pPr algn="ctr">
+              <a:spcBef>
+                <a:spcPct val="0"/>
+              </a:spcBef>
+            </a:pPr>
+            <a:r>
+              <a:rPr lang="en-US" sz="2000" dirty="0">
+                <a:solidFill>
+                  <a:srgbClr val="000000"/>
+                </a:solidFill>
+                <a:latin typeface="Open Sans"/>
+                <a:ea typeface="Open Sans"/>
+                <a:cs typeface="Open Sans"/>
+                <a:sym typeface="Open Sans"/>
+              </a:rPr>
+              <a:t>Máquina</a:t>
+            </a:r>
+          </a:p>
+          <a:p>
+            <a:pPr algn="ctr">
+              <a:spcBef>
+                <a:spcPct val="0"/>
+              </a:spcBef>
+            </a:pPr>
+            <a:r>
+              <a:rPr lang="en-US" sz="2000" dirty="0">
+                <a:solidFill>
+                  <a:srgbClr val="000000"/>
+                </a:solidFill>
+                <a:latin typeface="Open Sans"/>
+                <a:ea typeface="Open Sans"/>
+                <a:cs typeface="Open Sans"/>
+                <a:sym typeface="Open Sans"/>
+              </a:rPr>
+              <a:t> Virtual</a:t>
+            </a:r>
+          </a:p>
+        </p:txBody>
       </p:sp>
     </p:spTree>
   </p:cSld>

</xml_diff>